<commit_message>
added Sharif Logo, added BM section content
</commit_message>
<xml_diff>
--- a/slides/Introduction/antclass.pptx
+++ b/slides/Introduction/antclass.pptx
@@ -205,7 +205,7 @@
           <a:p>
             <a:fld id="{390F5A20-83B6-4E1F-8BA2-9AACAB8C13F2}" type="datetimeFigureOut">
               <a:rPr lang="en-US" smtClean="0"/>
-              <a:t>3/2/23</a:t>
+              <a:t>1/10/2025</a:t>
             </a:fld>
             <a:endParaRPr lang="en-US"/>
           </a:p>
@@ -370,7 +370,7 @@
           <a:p>
             <a:fld id="{6E48FCC2-677E-44C6-BB01-580A0185446D}" type="datetimeFigureOut">
               <a:rPr lang="en-US" smtClean="0"/>
-              <a:t>3/2/23</a:t>
+              <a:t>1/10/2025</a:t>
             </a:fld>
             <a:endParaRPr lang="en-US"/>
           </a:p>
@@ -753,7 +753,7 @@
           <p:nvPr userDrawn="1"/>
         </p:nvPicPr>
         <p:blipFill>
-          <a:blip r:embed="rId2">
+          <a:blip r:embed="rId2" cstate="print">
             <a:extLst>
               <a:ext uri="{28A0092B-C50C-407E-A947-70E740481C1C}">
                 <a14:useLocalDpi xmlns:a14="http://schemas.microsoft.com/office/drawing/2010/main" val="0"/>
@@ -1015,7 +1015,7 @@
           <p:nvPr userDrawn="1"/>
         </p:nvPicPr>
         <p:blipFill>
-          <a:blip r:embed="rId2">
+          <a:blip r:embed="rId2" cstate="print">
             <a:extLst>
               <a:ext uri="{28A0092B-C50C-407E-A947-70E740481C1C}">
                 <a14:useLocalDpi xmlns:a14="http://schemas.microsoft.com/office/drawing/2010/main" val="0"/>
@@ -1178,7 +1178,7 @@
           <p:nvPr userDrawn="1"/>
         </p:nvPicPr>
         <p:blipFill>
-          <a:blip r:embed="rId2">
+          <a:blip r:embed="rId2" cstate="print">
             <a:extLst>
               <a:ext uri="{28A0092B-C50C-407E-A947-70E740481C1C}">
                 <a14:useLocalDpi xmlns:a14="http://schemas.microsoft.com/office/drawing/2010/main" val="0"/>
@@ -1403,7 +1403,7 @@
           <p:nvPr userDrawn="1"/>
         </p:nvPicPr>
         <p:blipFill>
-          <a:blip r:embed="rId2">
+          <a:blip r:embed="rId2" cstate="print">
             <a:extLst>
               <a:ext uri="{28A0092B-C50C-407E-A947-70E740481C1C}">
                 <a14:useLocalDpi xmlns:a14="http://schemas.microsoft.com/office/drawing/2010/main" val="0"/>
@@ -1793,7 +1793,7 @@
           <p:nvPr userDrawn="1"/>
         </p:nvPicPr>
         <p:blipFill>
-          <a:blip r:embed="rId2">
+          <a:blip r:embed="rId2" cstate="print">
             <a:extLst>
               <a:ext uri="{28A0092B-C50C-407E-A947-70E740481C1C}">
                 <a14:useLocalDpi xmlns:a14="http://schemas.microsoft.com/office/drawing/2010/main" val="0"/>
@@ -1933,7 +1933,7 @@
           <p:nvPr userDrawn="1"/>
         </p:nvPicPr>
         <p:blipFill>
-          <a:blip r:embed="rId3">
+          <a:blip r:embed="rId3" cstate="print">
             <a:extLst>
               <a:ext uri="{28A0092B-C50C-407E-A947-70E740481C1C}">
                 <a14:useLocalDpi xmlns:a14="http://schemas.microsoft.com/office/drawing/2010/main" val="0"/>
@@ -2003,7 +2003,7 @@
           <p:nvPr userDrawn="1"/>
         </p:nvPicPr>
         <p:blipFill>
-          <a:blip r:embed="rId8">
+          <a:blip r:embed="rId8" cstate="print">
             <a:extLst>
               <a:ext uri="{28A0092B-C50C-407E-A947-70E740481C1C}">
                 <a14:useLocalDpi xmlns:a14="http://schemas.microsoft.com/office/drawing/2010/main" val="0"/>
@@ -2574,6 +2574,94 @@
           </a:p>
         </p:txBody>
       </p:sp>
+      <p:sp>
+        <p:nvSpPr>
+          <p:cNvPr id="7" name="Oval 6">
+            <a:extLst>
+              <a:ext uri="{FF2B5EF4-FFF2-40B4-BE49-F238E27FC236}">
+                <a16:creationId xmlns:a16="http://schemas.microsoft.com/office/drawing/2014/main" id="{F3552ACC-F7E5-384B-EE83-1A243C19AA7F}"/>
+              </a:ext>
+            </a:extLst>
+          </p:cNvPr>
+          <p:cNvSpPr/>
+          <p:nvPr/>
+        </p:nvSpPr>
+        <p:spPr>
+          <a:xfrm>
+            <a:off x="79514" y="1918251"/>
+            <a:ext cx="2107096" cy="3319670"/>
+          </a:xfrm>
+          <a:prstGeom prst="ellipse">
+            <a:avLst/>
+          </a:prstGeom>
+          <a:solidFill>
+            <a:srgbClr val="0A3866"/>
+          </a:solidFill>
+          <a:ln>
+            <a:noFill/>
+          </a:ln>
+        </p:spPr>
+        <p:style>
+          <a:lnRef idx="2">
+            <a:schemeClr val="accent1">
+              <a:shade val="15000"/>
+            </a:schemeClr>
+          </a:lnRef>
+          <a:fillRef idx="1">
+            <a:schemeClr val="accent1"/>
+          </a:fillRef>
+          <a:effectRef idx="0">
+            <a:schemeClr val="accent1"/>
+          </a:effectRef>
+          <a:fontRef idx="minor">
+            <a:schemeClr val="lt1"/>
+          </a:fontRef>
+        </p:style>
+        <p:txBody>
+          <a:bodyPr rtlCol="0" anchor="ctr"/>
+          <a:lstStyle/>
+          <a:p>
+            <a:pPr algn="ctr"/>
+            <a:endParaRPr lang="en-US"/>
+          </a:p>
+        </p:txBody>
+      </p:sp>
+      <p:pic>
+        <p:nvPicPr>
+          <p:cNvPr id="6" name="Picture 5" descr="A blue and black logo&#10;&#10;Description automatically generated">
+            <a:extLst>
+              <a:ext uri="{FF2B5EF4-FFF2-40B4-BE49-F238E27FC236}">
+                <a16:creationId xmlns:a16="http://schemas.microsoft.com/office/drawing/2014/main" id="{66E1E406-53FA-9961-2CFB-39CDBA0ACFE8}"/>
+              </a:ext>
+            </a:extLst>
+          </p:cNvPr>
+          <p:cNvPicPr>
+            <a:picLocks noChangeAspect="1"/>
+          </p:cNvPicPr>
+          <p:nvPr/>
+        </p:nvPicPr>
+        <p:blipFill>
+          <a:blip r:embed="rId3">
+            <a:extLst>
+              <a:ext uri="{28A0092B-C50C-407E-A947-70E740481C1C}">
+                <a14:useLocalDpi xmlns:a14="http://schemas.microsoft.com/office/drawing/2010/main" val="0"/>
+              </a:ext>
+            </a:extLst>
+          </a:blip>
+          <a:stretch>
+            <a:fillRect/>
+          </a:stretch>
+        </p:blipFill>
+        <p:spPr>
+          <a:xfrm>
+            <a:off x="180562" y="2334491"/>
+            <a:ext cx="1905000" cy="1905000"/>
+          </a:xfrm>
+          <a:prstGeom prst="rect">
+            <a:avLst/>
+          </a:prstGeom>
+        </p:spPr>
+      </p:pic>
     </p:spTree>
     <p:extLst>
       <p:ext uri="{BB962C8B-B14F-4D97-AF65-F5344CB8AC3E}">
@@ -3738,29 +3826,6 @@
 </file>
 
 <file path=customXml/item1.xml><?xml version="1.0" encoding="utf-8"?>
-<p:properties xmlns:p="http://schemas.microsoft.com/office/2006/metadata/properties" xmlns:xsi="http://www.w3.org/2001/XMLSchema-instance" xmlns:pc="http://schemas.microsoft.com/office/infopath/2007/PartnerControls">
-  <documentManagement>
-    <Notes xmlns="feee8034-9033-4907-8dcb-5196de7e654f" xsi:nil="true"/>
-    <_ip_UnifiedCompliancePolicyUIAction xmlns="http://schemas.microsoft.com/sharepoint/v3" xsi:nil="true"/>
-    <_ip_UnifiedCompliancePolicyProperties xmlns="http://schemas.microsoft.com/sharepoint/v3" xsi:nil="true"/>
-    <lcf76f155ced4ddcb4097134ff3c332f xmlns="feee8034-9033-4907-8dcb-5196de7e654f">
-      <Terms xmlns="http://schemas.microsoft.com/office/infopath/2007/PartnerControls"/>
-    </lcf76f155ced4ddcb4097134ff3c332f>
-    <TaxCatchAll xmlns="023d53c5-ba6d-47b0-817f-5227d1d77897" xsi:nil="true"/>
-  </documentManagement>
-</p:properties>
-</file>
-
-<file path=customXml/item2.xml><?xml version="1.0" encoding="utf-8"?>
-<?mso-contentType ?>
-<FormTemplates xmlns="http://schemas.microsoft.com/sharepoint/v3/contenttype/forms">
-  <Display>DocumentLibraryForm</Display>
-  <Edit>DocumentLibraryForm</Edit>
-  <New>DocumentLibraryForm</New>
-</FormTemplates>
-</file>
-
-<file path=customXml/item3.xml><?xml version="1.0" encoding="utf-8"?>
 <ct:contentTypeSchema xmlns:ct="http://schemas.microsoft.com/office/2006/metadata/contentType" xmlns:ma="http://schemas.microsoft.com/office/2006/metadata/properties/metaAttributes" ct:_="" ma:_="" ma:contentTypeName="Document" ma:contentTypeID="0x01010020E39590497D774B96B64C9F159359BB" ma:contentTypeVersion="19" ma:contentTypeDescription="Create a new document." ma:contentTypeScope="" ma:versionID="f2bf5891be82e8a473ae203039566004">
   <xsd:schema xmlns:xsd="http://www.w3.org/2001/XMLSchema" xmlns:xs="http://www.w3.org/2001/XMLSchema" xmlns:p="http://schemas.microsoft.com/office/2006/metadata/properties" xmlns:ns1="http://schemas.microsoft.com/sharepoint/v3" xmlns:ns2="feee8034-9033-4907-8dcb-5196de7e654f" xmlns:ns3="023d53c5-ba6d-47b0-817f-5227d1d77897" targetNamespace="http://schemas.microsoft.com/office/2006/metadata/properties" ma:root="true" ma:fieldsID="f87fef422fd11ad854d45484552ee2f2" ns1:_="" ns2:_="" ns3:_="">
     <xsd:import namespace="http://schemas.microsoft.com/sharepoint/v3"/>
@@ -4028,27 +4093,30 @@
 </ct:contentTypeSchema>
 </file>
 
-<file path=customXml/itemProps1.xml><?xml version="1.0" encoding="utf-8"?>
-<ds:datastoreItem xmlns:ds="http://schemas.openxmlformats.org/officeDocument/2006/customXml" ds:itemID="{083AE069-577B-4151-A6AD-9EC83A80F210}">
-  <ds:schemaRefs>
-    <ds:schemaRef ds:uri="http://schemas.microsoft.com/office/2006/metadata/properties"/>
-    <ds:schemaRef ds:uri="http://schemas.microsoft.com/office/infopath/2007/PartnerControls"/>
-    <ds:schemaRef ds:uri="feee8034-9033-4907-8dcb-5196de7e654f"/>
-    <ds:schemaRef ds:uri="http://schemas.microsoft.com/sharepoint/v3"/>
-    <ds:schemaRef ds:uri="023d53c5-ba6d-47b0-817f-5227d1d77897"/>
-  </ds:schemaRefs>
-</ds:datastoreItem>
+<file path=customXml/item2.xml><?xml version="1.0" encoding="utf-8"?>
+<?mso-contentType ?>
+<FormTemplates xmlns="http://schemas.microsoft.com/sharepoint/v3/contenttype/forms">
+  <Display>DocumentLibraryForm</Display>
+  <Edit>DocumentLibraryForm</Edit>
+  <New>DocumentLibraryForm</New>
+</FormTemplates>
 </file>
 
-<file path=customXml/itemProps2.xml><?xml version="1.0" encoding="utf-8"?>
-<ds:datastoreItem xmlns:ds="http://schemas.openxmlformats.org/officeDocument/2006/customXml" ds:itemID="{C0AC94D4-0F85-4BF5-8619-51E11717ECD2}">
-  <ds:schemaRefs>
-    <ds:schemaRef ds:uri="http://schemas.microsoft.com/sharepoint/v3/contenttype/forms"/>
-  </ds:schemaRefs>
-</ds:datastoreItem>
+<file path=customXml/item3.xml><?xml version="1.0" encoding="utf-8"?>
+<p:properties xmlns:p="http://schemas.microsoft.com/office/2006/metadata/properties" xmlns:xsi="http://www.w3.org/2001/XMLSchema-instance" xmlns:pc="http://schemas.microsoft.com/office/infopath/2007/PartnerControls">
+  <documentManagement>
+    <Notes xmlns="feee8034-9033-4907-8dcb-5196de7e654f" xsi:nil="true"/>
+    <_ip_UnifiedCompliancePolicyUIAction xmlns="http://schemas.microsoft.com/sharepoint/v3" xsi:nil="true"/>
+    <_ip_UnifiedCompliancePolicyProperties xmlns="http://schemas.microsoft.com/sharepoint/v3" xsi:nil="true"/>
+    <lcf76f155ced4ddcb4097134ff3c332f xmlns="feee8034-9033-4907-8dcb-5196de7e654f">
+      <Terms xmlns="http://schemas.microsoft.com/office/infopath/2007/PartnerControls"/>
+    </lcf76f155ced4ddcb4097134ff3c332f>
+    <TaxCatchAll xmlns="023d53c5-ba6d-47b0-817f-5227d1d77897" xsi:nil="true"/>
+  </documentManagement>
+</p:properties>
 </file>
 
-<file path=customXml/itemProps3.xml><?xml version="1.0" encoding="utf-8"?>
+<file path=customXml/itemProps1.xml><?xml version="1.0" encoding="utf-8"?>
 <ds:datastoreItem xmlns:ds="http://schemas.openxmlformats.org/officeDocument/2006/customXml" ds:itemID="{C898243A-0939-49EB-AC4E-205CB7759AB5}">
   <ds:schemaRefs>
     <ds:schemaRef ds:uri="http://schemas.microsoft.com/office/2006/metadata/contentType"/>
@@ -4066,4 +4134,24 @@
     <ds:schemaRef ds:uri="http://schemas.microsoft.com/internal/obd"/>
   </ds:schemaRefs>
 </ds:datastoreItem>
+</file>
+
+<file path=customXml/itemProps2.xml><?xml version="1.0" encoding="utf-8"?>
+<ds:datastoreItem xmlns:ds="http://schemas.openxmlformats.org/officeDocument/2006/customXml" ds:itemID="{C0AC94D4-0F85-4BF5-8619-51E11717ECD2}">
+  <ds:schemaRefs>
+    <ds:schemaRef ds:uri="http://schemas.microsoft.com/sharepoint/v3/contenttype/forms"/>
+  </ds:schemaRefs>
+</ds:datastoreItem>
+</file>
+
+<file path=customXml/itemProps3.xml><?xml version="1.0" encoding="utf-8"?>
+<ds:datastoreItem xmlns:ds="http://schemas.openxmlformats.org/officeDocument/2006/customXml" ds:itemID="{083AE069-577B-4151-A6AD-9EC83A80F210}">
+  <ds:schemaRefs>
+    <ds:schemaRef ds:uri="http://schemas.microsoft.com/office/2006/metadata/properties"/>
+    <ds:schemaRef ds:uri="http://schemas.microsoft.com/office/infopath/2007/PartnerControls"/>
+    <ds:schemaRef ds:uri="feee8034-9033-4907-8dcb-5196de7e654f"/>
+    <ds:schemaRef ds:uri="http://schemas.microsoft.com/sharepoint/v3"/>
+    <ds:schemaRef ds:uri="023d53c5-ba6d-47b0-817f-5227d1d77897"/>
+  </ds:schemaRefs>
+</ds:datastoreItem>
 </file>
</xml_diff>